<commit_message>
Assignment modified after seeing Hector's slides
</commit_message>
<xml_diff>
--- a/RDM101_Assignment1_Week1_DataFlowMap_Template.pptx
+++ b/RDM101_Assignment1_Week1_DataFlowMap_Template.pptx
@@ -5,14 +5,15 @@
     <p:sldMasterId id="2147483648" r:id="rId1"/>
   </p:sldMasterIdLst>
   <p:notesMasterIdLst>
-    <p:notesMasterId r:id="rId4"/>
+    <p:notesMasterId r:id="rId5"/>
   </p:notesMasterIdLst>
   <p:handoutMasterIdLst>
-    <p:handoutMasterId r:id="rId5"/>
+    <p:handoutMasterId r:id="rId6"/>
   </p:handoutMasterIdLst>
   <p:sldIdLst>
     <p:sldId id="261" r:id="rId2"/>
-    <p:sldId id="259" r:id="rId3"/>
+    <p:sldId id="262" r:id="rId3"/>
+    <p:sldId id="259" r:id="rId4"/>
   </p:sldIdLst>
   <p:sldSz cx="12192000" cy="6858000"/>
   <p:notesSz cx="6858000" cy="9144000"/>
@@ -141,7 +142,7 @@
 <file path=ppt/revisionInfo.xml><?xml version="1.0" encoding="utf-8"?>
 <p1510:revInfo xmlns:a="http://schemas.openxmlformats.org/drawingml/2006/main" xmlns:r="http://schemas.openxmlformats.org/officeDocument/2006/relationships" xmlns:p1510="http://schemas.microsoft.com/office/powerpoint/2015/10/main">
   <p1510:revLst>
-    <p1510:client id="{EDDE1661-9FCE-41C5-BD5C-3DCC4B58A825}" v="10" dt="2023-05-17T09:11:11.004"/>
+    <p1510:client id="{EDDE1661-9FCE-41C5-BD5C-3DCC4B58A825}" v="14" dt="2023-05-17T09:59:47.911"/>
   </p1510:revLst>
 </p1510:revInfo>
 </file>
@@ -150,8 +151,8 @@
 <pc:chgInfo xmlns:a="http://schemas.openxmlformats.org/drawingml/2006/main" xmlns:r="http://schemas.openxmlformats.org/officeDocument/2006/relationships" xmlns:ac="http://schemas.microsoft.com/office/drawing/2013/main/command" xmlns:pc="http://schemas.microsoft.com/office/powerpoint/2013/main/command">
   <pc:docChgLst>
     <pc:chgData name="Abdulkadir Biffo" userId="48d5a00c-ef51-413e-a040-a3b98278eae3" providerId="ADAL" clId="{EDDE1661-9FCE-41C5-BD5C-3DCC4B58A825}"/>
-    <pc:docChg chg="undo custSel modSld">
-      <pc:chgData name="Abdulkadir Biffo" userId="48d5a00c-ef51-413e-a040-a3b98278eae3" providerId="ADAL" clId="{EDDE1661-9FCE-41C5-BD5C-3DCC4B58A825}" dt="2023-05-17T09:11:27.940" v="1440" actId="1037"/>
+    <pc:docChg chg="undo custSel addSld modSld">
+      <pc:chgData name="Abdulkadir Biffo" userId="48d5a00c-ef51-413e-a040-a3b98278eae3" providerId="ADAL" clId="{EDDE1661-9FCE-41C5-BD5C-3DCC4B58A825}" dt="2023-05-17T09:59:57.882" v="2077" actId="1036"/>
       <pc:docMkLst>
         <pc:docMk/>
       </pc:docMkLst>
@@ -171,7 +172,7 @@
         </pc:grpChg>
       </pc:sldChg>
       <pc:sldChg chg="addSp delSp modSp mod">
-        <pc:chgData name="Abdulkadir Biffo" userId="48d5a00c-ef51-413e-a040-a3b98278eae3" providerId="ADAL" clId="{EDDE1661-9FCE-41C5-BD5C-3DCC4B58A825}" dt="2023-05-17T09:11:27.940" v="1440" actId="1037"/>
+        <pc:chgData name="Abdulkadir Biffo" userId="48d5a00c-ef51-413e-a040-a3b98278eae3" providerId="ADAL" clId="{EDDE1661-9FCE-41C5-BD5C-3DCC4B58A825}" dt="2023-05-17T09:59:41.803" v="2068" actId="255"/>
         <pc:sldMkLst>
           <pc:docMk/>
           <pc:sldMk cId="326961773" sldId="261"/>
@@ -313,7 +314,7 @@
           </ac:spMkLst>
         </pc:spChg>
         <pc:spChg chg="mod">
-          <ac:chgData name="Abdulkadir Biffo" userId="48d5a00c-ef51-413e-a040-a3b98278eae3" providerId="ADAL" clId="{EDDE1661-9FCE-41C5-BD5C-3DCC4B58A825}" dt="2023-05-17T09:10:05.638" v="1355" actId="20577"/>
+          <ac:chgData name="Abdulkadir Biffo" userId="48d5a00c-ef51-413e-a040-a3b98278eae3" providerId="ADAL" clId="{EDDE1661-9FCE-41C5-BD5C-3DCC4B58A825}" dt="2023-05-17T09:59:41.803" v="2068" actId="255"/>
           <ac:spMkLst>
             <pc:docMk/>
             <pc:sldMk cId="326961773" sldId="261"/>
@@ -369,7 +370,7 @@
           </ac:grpSpMkLst>
         </pc:grpChg>
         <pc:grpChg chg="add mod ord">
-          <ac:chgData name="Abdulkadir Biffo" userId="48d5a00c-ef51-413e-a040-a3b98278eae3" providerId="ADAL" clId="{EDDE1661-9FCE-41C5-BD5C-3DCC4B58A825}" dt="2023-05-17T09:11:27.940" v="1440" actId="1037"/>
+          <ac:chgData name="Abdulkadir Biffo" userId="48d5a00c-ef51-413e-a040-a3b98278eae3" providerId="ADAL" clId="{EDDE1661-9FCE-41C5-BD5C-3DCC4B58A825}" dt="2023-05-17T09:49:06.844" v="1443" actId="1036"/>
           <ac:grpSpMkLst>
             <pc:docMk/>
             <pc:sldMk cId="326961773" sldId="261"/>
@@ -390,6 +391,117 @@
             <pc:docMk/>
             <pc:sldMk cId="326961773" sldId="261"/>
             <ac:grpSpMk id="27" creationId="{C577112B-37DE-7A66-177A-490B3016756B}"/>
+          </ac:grpSpMkLst>
+        </pc:grpChg>
+      </pc:sldChg>
+      <pc:sldChg chg="addSp modSp new mod">
+        <pc:chgData name="Abdulkadir Biffo" userId="48d5a00c-ef51-413e-a040-a3b98278eae3" providerId="ADAL" clId="{EDDE1661-9FCE-41C5-BD5C-3DCC4B58A825}" dt="2023-05-17T09:59:57.882" v="2077" actId="1036"/>
+        <pc:sldMkLst>
+          <pc:docMk/>
+          <pc:sldMk cId="4047636853" sldId="262"/>
+        </pc:sldMkLst>
+        <pc:spChg chg="mod">
+          <ac:chgData name="Abdulkadir Biffo" userId="48d5a00c-ef51-413e-a040-a3b98278eae3" providerId="ADAL" clId="{EDDE1661-9FCE-41C5-BD5C-3DCC4B58A825}" dt="2023-05-17T09:59:16.066" v="2066" actId="20577"/>
+          <ac:spMkLst>
+            <pc:docMk/>
+            <pc:sldMk cId="4047636853" sldId="262"/>
+            <ac:spMk id="3" creationId="{6149154C-2EE9-E236-DBB2-33E392374435}"/>
+          </ac:spMkLst>
+        </pc:spChg>
+        <pc:spChg chg="mod">
+          <ac:chgData name="Abdulkadir Biffo" userId="48d5a00c-ef51-413e-a040-a3b98278eae3" providerId="ADAL" clId="{EDDE1661-9FCE-41C5-BD5C-3DCC4B58A825}" dt="2023-05-17T09:53:59.997" v="1723" actId="20577"/>
+          <ac:spMkLst>
+            <pc:docMk/>
+            <pc:sldMk cId="4047636853" sldId="262"/>
+            <ac:spMk id="4" creationId="{11ABD906-F9DE-B4E3-2861-C4EB7CC46F7B}"/>
+          </ac:spMkLst>
+        </pc:spChg>
+        <pc:spChg chg="mod">
+          <ac:chgData name="Abdulkadir Biffo" userId="48d5a00c-ef51-413e-a040-a3b98278eae3" providerId="ADAL" clId="{EDDE1661-9FCE-41C5-BD5C-3DCC4B58A825}" dt="2023-05-17T09:51:22.661" v="1466" actId="20577"/>
+          <ac:spMkLst>
+            <pc:docMk/>
+            <pc:sldMk cId="4047636853" sldId="262"/>
+            <ac:spMk id="6" creationId="{AC0E96D3-0375-0413-48BC-6377DC330C2F}"/>
+          </ac:spMkLst>
+        </pc:spChg>
+        <pc:spChg chg="mod">
+          <ac:chgData name="Abdulkadir Biffo" userId="48d5a00c-ef51-413e-a040-a3b98278eae3" providerId="ADAL" clId="{EDDE1661-9FCE-41C5-BD5C-3DCC4B58A825}" dt="2023-05-17T09:56:56.553" v="1789" actId="114"/>
+          <ac:spMkLst>
+            <pc:docMk/>
+            <pc:sldMk cId="4047636853" sldId="262"/>
+            <ac:spMk id="7" creationId="{14242325-5A67-8E94-8210-D3EA68B5B7EF}"/>
+          </ac:spMkLst>
+        </pc:spChg>
+        <pc:spChg chg="mod">
+          <ac:chgData name="Abdulkadir Biffo" userId="48d5a00c-ef51-413e-a040-a3b98278eae3" providerId="ADAL" clId="{EDDE1661-9FCE-41C5-BD5C-3DCC4B58A825}" dt="2023-05-17T09:59:57.882" v="2077" actId="1036"/>
+          <ac:spMkLst>
+            <pc:docMk/>
+            <pc:sldMk cId="4047636853" sldId="262"/>
+            <ac:spMk id="9" creationId="{D1FAAEEE-D985-9D23-C026-4C1DDA2AC501}"/>
+          </ac:spMkLst>
+        </pc:spChg>
+        <pc:spChg chg="mod">
+          <ac:chgData name="Abdulkadir Biffo" userId="48d5a00c-ef51-413e-a040-a3b98278eae3" providerId="ADAL" clId="{EDDE1661-9FCE-41C5-BD5C-3DCC4B58A825}" dt="2023-05-17T09:54:10.332" v="1724"/>
+          <ac:spMkLst>
+            <pc:docMk/>
+            <pc:sldMk cId="4047636853" sldId="262"/>
+            <ac:spMk id="11" creationId="{FDF44CFA-42E4-9101-78E5-81AFA0DEBFB2}"/>
+          </ac:spMkLst>
+        </pc:spChg>
+        <pc:spChg chg="mod">
+          <ac:chgData name="Abdulkadir Biffo" userId="48d5a00c-ef51-413e-a040-a3b98278eae3" providerId="ADAL" clId="{EDDE1661-9FCE-41C5-BD5C-3DCC4B58A825}" dt="2023-05-17T09:54:10.332" v="1724"/>
+          <ac:spMkLst>
+            <pc:docMk/>
+            <pc:sldMk cId="4047636853" sldId="262"/>
+            <ac:spMk id="12" creationId="{84D3DF94-124F-207F-17A8-359BE28CF971}"/>
+          </ac:spMkLst>
+        </pc:spChg>
+        <pc:spChg chg="add mod">
+          <ac:chgData name="Abdulkadir Biffo" userId="48d5a00c-ef51-413e-a040-a3b98278eae3" providerId="ADAL" clId="{EDDE1661-9FCE-41C5-BD5C-3DCC4B58A825}" dt="2023-05-17T09:55:24.046" v="1750" actId="255"/>
+          <ac:spMkLst>
+            <pc:docMk/>
+            <pc:sldMk cId="4047636853" sldId="262"/>
+            <ac:spMk id="13" creationId="{FA984B3D-4AEC-01B0-C536-0BEB7FB3E71E}"/>
+          </ac:spMkLst>
+        </pc:spChg>
+        <pc:spChg chg="add mod">
+          <ac:chgData name="Abdulkadir Biffo" userId="48d5a00c-ef51-413e-a040-a3b98278eae3" providerId="ADAL" clId="{EDDE1661-9FCE-41C5-BD5C-3DCC4B58A825}" dt="2023-05-17T09:57:20.695" v="1792" actId="20577"/>
+          <ac:spMkLst>
+            <pc:docMk/>
+            <pc:sldMk cId="4047636853" sldId="262"/>
+            <ac:spMk id="14" creationId="{A9210FD3-807F-CF3D-90BD-FDE513F72C82}"/>
+          </ac:spMkLst>
+        </pc:spChg>
+        <pc:spChg chg="mod">
+          <ac:chgData name="Abdulkadir Biffo" userId="48d5a00c-ef51-413e-a040-a3b98278eae3" providerId="ADAL" clId="{EDDE1661-9FCE-41C5-BD5C-3DCC4B58A825}" dt="2023-05-17T09:59:47.911" v="2069"/>
+          <ac:spMkLst>
+            <pc:docMk/>
+            <pc:sldMk cId="4047636853" sldId="262"/>
+            <ac:spMk id="16" creationId="{6C7FF5B3-D10E-3048-04DC-28DF52F857E8}"/>
+          </ac:spMkLst>
+        </pc:spChg>
+        <pc:spChg chg="mod">
+          <ac:chgData name="Abdulkadir Biffo" userId="48d5a00c-ef51-413e-a040-a3b98278eae3" providerId="ADAL" clId="{EDDE1661-9FCE-41C5-BD5C-3DCC4B58A825}" dt="2023-05-17T09:59:47.911" v="2069"/>
+          <ac:spMkLst>
+            <pc:docMk/>
+            <pc:sldMk cId="4047636853" sldId="262"/>
+            <ac:spMk id="17" creationId="{18E5905E-9C38-6015-4DDF-B909DCFF3013}"/>
+          </ac:spMkLst>
+        </pc:spChg>
+        <pc:grpChg chg="add mod ord">
+          <ac:chgData name="Abdulkadir Biffo" userId="48d5a00c-ef51-413e-a040-a3b98278eae3" providerId="ADAL" clId="{EDDE1661-9FCE-41C5-BD5C-3DCC4B58A825}" dt="2023-05-17T09:54:13.116" v="1725" actId="167"/>
+          <ac:grpSpMkLst>
+            <pc:docMk/>
+            <pc:sldMk cId="4047636853" sldId="262"/>
+            <ac:grpSpMk id="10" creationId="{500C0F60-BD8B-474D-A087-133A4AB52EC0}"/>
+          </ac:grpSpMkLst>
+        </pc:grpChg>
+        <pc:grpChg chg="add mod ord">
+          <ac:chgData name="Abdulkadir Biffo" userId="48d5a00c-ef51-413e-a040-a3b98278eae3" providerId="ADAL" clId="{EDDE1661-9FCE-41C5-BD5C-3DCC4B58A825}" dt="2023-05-17T09:59:54.449" v="2070" actId="167"/>
+          <ac:grpSpMkLst>
+            <pc:docMk/>
+            <pc:sldMk cId="4047636853" sldId="262"/>
+            <ac:grpSpMk id="15" creationId="{95B6C359-BDD1-544D-5E9B-5F603C3F284A}"/>
           </ac:grpSpMkLst>
         </pc:grpChg>
       </pc:sldChg>
@@ -5481,7 +5593,7 @@
         </p:nvGrpSpPr>
         <p:grpSpPr>
           <a:xfrm>
-            <a:off x="10906512" y="796888"/>
+            <a:off x="10906512" y="788179"/>
             <a:ext cx="1250652" cy="1097169"/>
             <a:chOff x="3542040" y="734824"/>
             <a:chExt cx="937658" cy="515983"/>
@@ -6126,34 +6238,39 @@
             <p:ph type="body" sz="quarter" idx="18"/>
           </p:nvPr>
         </p:nvSpPr>
-        <p:spPr/>
+        <p:spPr>
+          <a:xfrm>
+            <a:off x="7888329" y="1590635"/>
+            <a:ext cx="3227387" cy="3956728"/>
+          </a:xfrm>
+        </p:spPr>
         <p:txBody>
           <a:bodyPr/>
           <a:lstStyle/>
           <a:p>
             <a:r>
-              <a:rPr lang="nl-NL" sz="1050" dirty="0"/>
+              <a:rPr lang="nl-NL" dirty="0"/>
               <a:t>Q1. The data is stored on my project data hosted by the Reactor Institute, TU Delft. This can be accessed using the webdrive software. Also, I run analysis using my PC and I synchronise all my resarch folders on onedrive</a:t>
             </a:r>
           </a:p>
           <a:p>
-            <a:endParaRPr lang="nl-NL" sz="1050" dirty="0"/>
-          </a:p>
-          <a:p>
-            <a:r>
-              <a:rPr lang="nl-NL" sz="1050" dirty="0"/>
+            <a:endParaRPr lang="nl-NL" dirty="0"/>
+          </a:p>
+          <a:p>
+            <a:r>
+              <a:rPr lang="nl-NL" dirty="0"/>
               <a:t>Q2. The master copy is stored on Reactor Institute’s project data storage (Webdrive).</a:t>
             </a:r>
           </a:p>
           <a:p>
-            <a:endParaRPr lang="nl-NL" sz="1050" dirty="0"/>
-          </a:p>
-          <a:p>
-            <a:endParaRPr lang="nl-NL" sz="1050" dirty="0"/>
-          </a:p>
-          <a:p>
-            <a:r>
-              <a:rPr lang="nl-NL" sz="1050" dirty="0"/>
+            <a:endParaRPr lang="nl-NL" dirty="0"/>
+          </a:p>
+          <a:p>
+            <a:endParaRPr lang="nl-NL" dirty="0"/>
+          </a:p>
+          <a:p>
+            <a:r>
+              <a:rPr lang="nl-NL" dirty="0"/>
               <a:t>Q3. Project Data and Onedrive</a:t>
             </a:r>
           </a:p>
@@ -6535,6 +6652,660 @@
           <a:chExt cx="0" cy="0"/>
         </a:xfrm>
       </p:grpSpPr>
+      <p:grpSp>
+        <p:nvGrpSpPr>
+          <p:cNvPr id="15" name="Group 63">
+            <a:extLst>
+              <a:ext uri="{FF2B5EF4-FFF2-40B4-BE49-F238E27FC236}">
+                <a16:creationId xmlns:a16="http://schemas.microsoft.com/office/drawing/2014/main" id="{95B6C359-BDD1-544D-5E9B-5F603C3F284A}"/>
+              </a:ext>
+            </a:extLst>
+          </p:cNvPr>
+          <p:cNvGrpSpPr/>
+          <p:nvPr/>
+        </p:nvGrpSpPr>
+        <p:grpSpPr>
+          <a:xfrm>
+            <a:off x="10906512" y="788179"/>
+            <a:ext cx="1250652" cy="1097169"/>
+            <a:chOff x="3542040" y="734824"/>
+            <a:chExt cx="937658" cy="515983"/>
+          </a:xfrm>
+          <a:solidFill>
+            <a:srgbClr val="AC5454"/>
+          </a:solidFill>
+        </p:grpSpPr>
+        <p:sp>
+          <p:nvSpPr>
+            <p:cNvPr id="16" name="Isosceles Triangle 64">
+              <a:extLst>
+                <a:ext uri="{FF2B5EF4-FFF2-40B4-BE49-F238E27FC236}">
+                  <a16:creationId xmlns:a16="http://schemas.microsoft.com/office/drawing/2014/main" id="{6C7FF5B3-D10E-3048-04DC-28DF52F857E8}"/>
+                </a:ext>
+              </a:extLst>
+            </p:cNvPr>
+            <p:cNvSpPr/>
+            <p:nvPr/>
+          </p:nvSpPr>
+          <p:spPr>
+            <a:xfrm rot="5400000">
+              <a:off x="3772501" y="543611"/>
+              <a:ext cx="515983" cy="898409"/>
+            </a:xfrm>
+            <a:prstGeom prst="triangle">
+              <a:avLst/>
+            </a:prstGeom>
+            <a:grpFill/>
+            <a:ln>
+              <a:solidFill>
+                <a:schemeClr val="tx1"/>
+              </a:solidFill>
+              <a:prstDash val="solid"/>
+            </a:ln>
+          </p:spPr>
+          <p:style>
+            <a:lnRef idx="1">
+              <a:schemeClr val="accent1"/>
+            </a:lnRef>
+            <a:fillRef idx="3">
+              <a:schemeClr val="accent1"/>
+            </a:fillRef>
+            <a:effectRef idx="2">
+              <a:schemeClr val="accent1"/>
+            </a:effectRef>
+            <a:fontRef idx="minor">
+              <a:schemeClr val="lt1"/>
+            </a:fontRef>
+          </p:style>
+          <p:txBody>
+            <a:bodyPr rtlCol="0" anchor="ctr"/>
+            <a:lstStyle/>
+            <a:p>
+              <a:pPr algn="ctr"/>
+              <a:endParaRPr lang="en-US" dirty="0"/>
+            </a:p>
+          </p:txBody>
+        </p:sp>
+        <p:sp>
+          <p:nvSpPr>
+            <p:cNvPr id="17" name="TextBox 65">
+              <a:extLst>
+                <a:ext uri="{FF2B5EF4-FFF2-40B4-BE49-F238E27FC236}">
+                  <a16:creationId xmlns:a16="http://schemas.microsoft.com/office/drawing/2014/main" id="{18E5905E-9C38-6015-4DDF-B909DCFF3013}"/>
+                </a:ext>
+              </a:extLst>
+            </p:cNvPr>
+            <p:cNvSpPr txBox="1"/>
+            <p:nvPr/>
+          </p:nvSpPr>
+          <p:spPr>
+            <a:xfrm>
+              <a:off x="3542040" y="862734"/>
+              <a:ext cx="937658" cy="275011"/>
+            </a:xfrm>
+            <a:prstGeom prst="rect">
+              <a:avLst/>
+            </a:prstGeom>
+            <a:noFill/>
+          </p:spPr>
+          <p:txBody>
+            <a:bodyPr wrap="square" rtlCol="0">
+              <a:spAutoFit/>
+            </a:bodyPr>
+            <a:lstStyle/>
+            <a:p>
+              <a:r>
+                <a:rPr lang="en-GB" sz="1600" dirty="0"/>
+                <a:t>Personal data</a:t>
+              </a:r>
+            </a:p>
+          </p:txBody>
+        </p:sp>
+      </p:grpSp>
+      <p:grpSp>
+        <p:nvGrpSpPr>
+          <p:cNvPr id="10" name="Group 63">
+            <a:extLst>
+              <a:ext uri="{FF2B5EF4-FFF2-40B4-BE49-F238E27FC236}">
+                <a16:creationId xmlns:a16="http://schemas.microsoft.com/office/drawing/2014/main" id="{500C0F60-BD8B-474D-A087-133A4AB52EC0}"/>
+              </a:ext>
+            </a:extLst>
+          </p:cNvPr>
+          <p:cNvGrpSpPr/>
+          <p:nvPr/>
+        </p:nvGrpSpPr>
+        <p:grpSpPr>
+          <a:xfrm>
+            <a:off x="3776582" y="774263"/>
+            <a:ext cx="1250652" cy="1097169"/>
+            <a:chOff x="3542040" y="734824"/>
+            <a:chExt cx="937658" cy="515983"/>
+          </a:xfrm>
+          <a:solidFill>
+            <a:srgbClr val="AC5454"/>
+          </a:solidFill>
+        </p:grpSpPr>
+        <p:sp>
+          <p:nvSpPr>
+            <p:cNvPr id="11" name="Isosceles Triangle 64">
+              <a:extLst>
+                <a:ext uri="{FF2B5EF4-FFF2-40B4-BE49-F238E27FC236}">
+                  <a16:creationId xmlns:a16="http://schemas.microsoft.com/office/drawing/2014/main" id="{FDF44CFA-42E4-9101-78E5-81AFA0DEBFB2}"/>
+                </a:ext>
+              </a:extLst>
+            </p:cNvPr>
+            <p:cNvSpPr/>
+            <p:nvPr/>
+          </p:nvSpPr>
+          <p:spPr>
+            <a:xfrm rot="5400000">
+              <a:off x="3772501" y="543611"/>
+              <a:ext cx="515983" cy="898409"/>
+            </a:xfrm>
+            <a:prstGeom prst="triangle">
+              <a:avLst/>
+            </a:prstGeom>
+            <a:grpFill/>
+            <a:ln>
+              <a:solidFill>
+                <a:schemeClr val="tx1"/>
+              </a:solidFill>
+              <a:prstDash val="solid"/>
+            </a:ln>
+          </p:spPr>
+          <p:style>
+            <a:lnRef idx="1">
+              <a:schemeClr val="accent1"/>
+            </a:lnRef>
+            <a:fillRef idx="3">
+              <a:schemeClr val="accent1"/>
+            </a:fillRef>
+            <a:effectRef idx="2">
+              <a:schemeClr val="accent1"/>
+            </a:effectRef>
+            <a:fontRef idx="minor">
+              <a:schemeClr val="lt1"/>
+            </a:fontRef>
+          </p:style>
+          <p:txBody>
+            <a:bodyPr rtlCol="0" anchor="ctr"/>
+            <a:lstStyle/>
+            <a:p>
+              <a:pPr algn="ctr"/>
+              <a:endParaRPr lang="en-US" dirty="0"/>
+            </a:p>
+          </p:txBody>
+        </p:sp>
+        <p:sp>
+          <p:nvSpPr>
+            <p:cNvPr id="12" name="TextBox 65">
+              <a:extLst>
+                <a:ext uri="{FF2B5EF4-FFF2-40B4-BE49-F238E27FC236}">
+                  <a16:creationId xmlns:a16="http://schemas.microsoft.com/office/drawing/2014/main" id="{84D3DF94-124F-207F-17A8-359BE28CF971}"/>
+                </a:ext>
+              </a:extLst>
+            </p:cNvPr>
+            <p:cNvSpPr txBox="1"/>
+            <p:nvPr/>
+          </p:nvSpPr>
+          <p:spPr>
+            <a:xfrm>
+              <a:off x="3542040" y="862734"/>
+              <a:ext cx="937658" cy="275011"/>
+            </a:xfrm>
+            <a:prstGeom prst="rect">
+              <a:avLst/>
+            </a:prstGeom>
+            <a:noFill/>
+          </p:spPr>
+          <p:txBody>
+            <a:bodyPr wrap="square" rtlCol="0">
+              <a:spAutoFit/>
+            </a:bodyPr>
+            <a:lstStyle/>
+            <a:p>
+              <a:r>
+                <a:rPr lang="en-GB" sz="1600" dirty="0"/>
+                <a:t>Personal data</a:t>
+              </a:r>
+            </a:p>
+          </p:txBody>
+        </p:sp>
+      </p:grpSp>
+      <p:sp>
+        <p:nvSpPr>
+          <p:cNvPr id="2" name="Text Placeholder 1">
+            <a:extLst>
+              <a:ext uri="{FF2B5EF4-FFF2-40B4-BE49-F238E27FC236}">
+                <a16:creationId xmlns:a16="http://schemas.microsoft.com/office/drawing/2014/main" id="{6B5ADE98-782B-E861-05CA-96437E74894D}"/>
+              </a:ext>
+            </a:extLst>
+          </p:cNvPr>
+          <p:cNvSpPr>
+            <a:spLocks noGrp="1"/>
+          </p:cNvSpPr>
+          <p:nvPr>
+            <p:ph type="body" sz="quarter" idx="24"/>
+          </p:nvPr>
+        </p:nvSpPr>
+        <p:spPr/>
+        <p:txBody>
+          <a:bodyPr/>
+          <a:lstStyle/>
+          <a:p>
+            <a:endParaRPr lang="en-NL"/>
+          </a:p>
+        </p:txBody>
+      </p:sp>
+      <p:sp>
+        <p:nvSpPr>
+          <p:cNvPr id="3" name="Text Placeholder 2">
+            <a:extLst>
+              <a:ext uri="{FF2B5EF4-FFF2-40B4-BE49-F238E27FC236}">
+                <a16:creationId xmlns:a16="http://schemas.microsoft.com/office/drawing/2014/main" id="{6149154C-2EE9-E236-DBB2-33E392374435}"/>
+              </a:ext>
+            </a:extLst>
+          </p:cNvPr>
+          <p:cNvSpPr>
+            <a:spLocks noGrp="1"/>
+          </p:cNvSpPr>
+          <p:nvPr>
+            <p:ph type="body" sz="quarter" idx="23"/>
+          </p:nvPr>
+        </p:nvSpPr>
+        <p:spPr/>
+        <p:txBody>
+          <a:bodyPr>
+            <a:normAutofit fontScale="85000" lnSpcReduction="20000"/>
+          </a:bodyPr>
+          <a:lstStyle/>
+          <a:p>
+            <a:r>
+              <a:rPr lang="en-GB" dirty="0"/>
+              <a:t>These include posters and presentation slides. The size is dependent on the quality and quantity of each file. The format could be .jpeg, .pdf, etc.</a:t>
+            </a:r>
+            <a:endParaRPr lang="en-NL" dirty="0"/>
+          </a:p>
+        </p:txBody>
+      </p:sp>
+      <p:sp>
+        <p:nvSpPr>
+          <p:cNvPr id="4" name="Text Placeholder 3">
+            <a:extLst>
+              <a:ext uri="{FF2B5EF4-FFF2-40B4-BE49-F238E27FC236}">
+                <a16:creationId xmlns:a16="http://schemas.microsoft.com/office/drawing/2014/main" id="{11ABD906-F9DE-B4E3-2861-C4EB7CC46F7B}"/>
+              </a:ext>
+            </a:extLst>
+          </p:cNvPr>
+          <p:cNvSpPr>
+            <a:spLocks noGrp="1"/>
+          </p:cNvSpPr>
+          <p:nvPr>
+            <p:ph type="body" sz="quarter" idx="22"/>
+          </p:nvPr>
+        </p:nvSpPr>
+        <p:spPr/>
+        <p:txBody>
+          <a:bodyPr>
+            <a:normAutofit fontScale="77500" lnSpcReduction="20000"/>
+          </a:bodyPr>
+          <a:lstStyle/>
+          <a:p>
+            <a:r>
+              <a:rPr lang="en-GB" dirty="0"/>
+              <a:t>These are created using </a:t>
+            </a:r>
+            <a:r>
+              <a:rPr lang="en-GB" dirty="0" err="1"/>
+              <a:t>VSCode</a:t>
+            </a:r>
+            <a:r>
+              <a:rPr lang="en-GB" dirty="0"/>
+              <a:t>. They have .</a:t>
+            </a:r>
+            <a:r>
+              <a:rPr lang="en-GB" dirty="0" err="1"/>
+              <a:t>ipynb</a:t>
+            </a:r>
+            <a:r>
+              <a:rPr lang="en-GB" dirty="0"/>
+              <a:t> format and the size is dependent on the length of each script. Theses scripts are written for data analysis and visualisation.</a:t>
+            </a:r>
+            <a:endParaRPr lang="en-NL" dirty="0"/>
+          </a:p>
+        </p:txBody>
+      </p:sp>
+      <p:sp>
+        <p:nvSpPr>
+          <p:cNvPr id="5" name="Slide Number Placeholder 4">
+            <a:extLst>
+              <a:ext uri="{FF2B5EF4-FFF2-40B4-BE49-F238E27FC236}">
+                <a16:creationId xmlns:a16="http://schemas.microsoft.com/office/drawing/2014/main" id="{3348C269-0B31-16D4-B6FD-7E004200E611}"/>
+              </a:ext>
+            </a:extLst>
+          </p:cNvPr>
+          <p:cNvSpPr>
+            <a:spLocks noGrp="1"/>
+          </p:cNvSpPr>
+          <p:nvPr>
+            <p:ph type="sldNum" sz="quarter" idx="12"/>
+          </p:nvPr>
+        </p:nvSpPr>
+        <p:spPr/>
+        <p:txBody>
+          <a:bodyPr/>
+          <a:lstStyle/>
+          <a:p>
+            <a:fld id="{D69ED902-D6D9-4EE0-97FF-47651DD2F3D6}" type="slidenum">
+              <a:rPr lang="nl-NL" smtClean="0"/>
+              <a:t>2</a:t>
+            </a:fld>
+            <a:endParaRPr lang="nl-NL"/>
+          </a:p>
+        </p:txBody>
+      </p:sp>
+      <p:sp>
+        <p:nvSpPr>
+          <p:cNvPr id="6" name="Text Placeholder 5">
+            <a:extLst>
+              <a:ext uri="{FF2B5EF4-FFF2-40B4-BE49-F238E27FC236}">
+                <a16:creationId xmlns:a16="http://schemas.microsoft.com/office/drawing/2014/main" id="{AC0E96D3-0375-0413-48BC-6377DC330C2F}"/>
+              </a:ext>
+            </a:extLst>
+          </p:cNvPr>
+          <p:cNvSpPr>
+            <a:spLocks noGrp="1"/>
+          </p:cNvSpPr>
+          <p:nvPr>
+            <p:ph type="body" sz="quarter" idx="14"/>
+          </p:nvPr>
+        </p:nvSpPr>
+        <p:spPr/>
+        <p:txBody>
+          <a:bodyPr/>
+          <a:lstStyle/>
+          <a:p>
+            <a:r>
+              <a:rPr lang="en-GB" dirty="0"/>
+              <a:t>Python Scripts</a:t>
+            </a:r>
+            <a:endParaRPr lang="en-NL" dirty="0"/>
+          </a:p>
+        </p:txBody>
+      </p:sp>
+      <p:sp>
+        <p:nvSpPr>
+          <p:cNvPr id="7" name="Text Placeholder 6">
+            <a:extLst>
+              <a:ext uri="{FF2B5EF4-FFF2-40B4-BE49-F238E27FC236}">
+                <a16:creationId xmlns:a16="http://schemas.microsoft.com/office/drawing/2014/main" id="{14242325-5A67-8E94-8210-D3EA68B5B7EF}"/>
+              </a:ext>
+            </a:extLst>
+          </p:cNvPr>
+          <p:cNvSpPr>
+            <a:spLocks noGrp="1"/>
+          </p:cNvSpPr>
+          <p:nvPr>
+            <p:ph type="body" sz="quarter" idx="15"/>
+          </p:nvPr>
+        </p:nvSpPr>
+        <p:spPr/>
+        <p:txBody>
+          <a:bodyPr/>
+          <a:lstStyle/>
+          <a:p>
+            <a:r>
+              <a:rPr lang="en-GB" dirty="0"/>
+              <a:t>Visuals (thanks to </a:t>
+            </a:r>
+            <a:r>
+              <a:rPr lang="en-GB" b="0" dirty="0">
+                <a:effectLst/>
+              </a:rPr>
+              <a:t>Héctor)</a:t>
+            </a:r>
+            <a:endParaRPr lang="en-NL" dirty="0"/>
+          </a:p>
+        </p:txBody>
+      </p:sp>
+      <p:sp>
+        <p:nvSpPr>
+          <p:cNvPr id="8" name="Text Placeholder 7">
+            <a:extLst>
+              <a:ext uri="{FF2B5EF4-FFF2-40B4-BE49-F238E27FC236}">
+                <a16:creationId xmlns:a16="http://schemas.microsoft.com/office/drawing/2014/main" id="{AB48B71F-A6A5-EAEE-670C-FAC7F2D3C24C}"/>
+              </a:ext>
+            </a:extLst>
+          </p:cNvPr>
+          <p:cNvSpPr>
+            <a:spLocks noGrp="1"/>
+          </p:cNvSpPr>
+          <p:nvPr>
+            <p:ph type="body" sz="quarter" idx="16"/>
+          </p:nvPr>
+        </p:nvSpPr>
+        <p:spPr/>
+        <p:txBody>
+          <a:bodyPr/>
+          <a:lstStyle/>
+          <a:p>
+            <a:endParaRPr lang="en-NL"/>
+          </a:p>
+        </p:txBody>
+      </p:sp>
+      <p:sp>
+        <p:nvSpPr>
+          <p:cNvPr id="9" name="Text Placeholder 8">
+            <a:extLst>
+              <a:ext uri="{FF2B5EF4-FFF2-40B4-BE49-F238E27FC236}">
+                <a16:creationId xmlns:a16="http://schemas.microsoft.com/office/drawing/2014/main" id="{D1FAAEEE-D985-9D23-C026-4C1DDA2AC501}"/>
+              </a:ext>
+            </a:extLst>
+          </p:cNvPr>
+          <p:cNvSpPr>
+            <a:spLocks noGrp="1"/>
+          </p:cNvSpPr>
+          <p:nvPr>
+            <p:ph type="body" sz="quarter" idx="18"/>
+          </p:nvPr>
+        </p:nvSpPr>
+        <p:spPr>
+          <a:xfrm>
+            <a:off x="7884460" y="1590635"/>
+            <a:ext cx="3227387" cy="3956728"/>
+          </a:xfrm>
+        </p:spPr>
+        <p:txBody>
+          <a:bodyPr/>
+          <a:lstStyle/>
+          <a:p>
+            <a:r>
+              <a:rPr lang="nl-NL" sz="1400" dirty="0"/>
+              <a:t>Q1. The data is stored on my project data hosted by the Reactor Institute, TU Delft. This can be accessed using the webdrive software. Also, I run analysis using my PC and I synchronise all my resarch folders on onedrive</a:t>
+            </a:r>
+          </a:p>
+          <a:p>
+            <a:endParaRPr lang="nl-NL" sz="1400" dirty="0"/>
+          </a:p>
+          <a:p>
+            <a:r>
+              <a:rPr lang="nl-NL" sz="1400" dirty="0"/>
+              <a:t>Q2. The master copy is stored on Reactor Institute’s project data storage (Webdrive).</a:t>
+            </a:r>
+          </a:p>
+          <a:p>
+            <a:endParaRPr lang="nl-NL" sz="1400" dirty="0"/>
+          </a:p>
+          <a:p>
+            <a:endParaRPr lang="nl-NL" sz="1400" dirty="0"/>
+          </a:p>
+          <a:p>
+            <a:r>
+              <a:rPr lang="nl-NL" sz="1400" dirty="0"/>
+              <a:t>Q3. Project Data and Onedrive</a:t>
+            </a:r>
+          </a:p>
+          <a:p>
+            <a:endParaRPr lang="en-NL" dirty="0"/>
+          </a:p>
+        </p:txBody>
+      </p:sp>
+      <p:sp>
+        <p:nvSpPr>
+          <p:cNvPr id="13" name="Right Arrow 32">
+            <a:extLst>
+              <a:ext uri="{FF2B5EF4-FFF2-40B4-BE49-F238E27FC236}">
+                <a16:creationId xmlns:a16="http://schemas.microsoft.com/office/drawing/2014/main" id="{FA984B3D-4AEC-01B0-C536-0BEB7FB3E71E}"/>
+              </a:ext>
+            </a:extLst>
+          </p:cNvPr>
+          <p:cNvSpPr/>
+          <p:nvPr/>
+        </p:nvSpPr>
+        <p:spPr>
+          <a:xfrm>
+            <a:off x="921886" y="1755206"/>
+            <a:ext cx="1172890" cy="674131"/>
+          </a:xfrm>
+          <a:prstGeom prst="rightArrow">
+            <a:avLst/>
+          </a:prstGeom>
+          <a:solidFill>
+            <a:schemeClr val="accent6">
+              <a:lumMod val="40000"/>
+              <a:lumOff val="60000"/>
+            </a:schemeClr>
+          </a:solidFill>
+          <a:ln>
+            <a:solidFill>
+              <a:schemeClr val="tx1"/>
+            </a:solidFill>
+            <a:prstDash val="solid"/>
+          </a:ln>
+        </p:spPr>
+        <p:style>
+          <a:lnRef idx="1">
+            <a:schemeClr val="accent1"/>
+          </a:lnRef>
+          <a:fillRef idx="3">
+            <a:schemeClr val="accent1"/>
+          </a:fillRef>
+          <a:effectRef idx="2">
+            <a:schemeClr val="accent1"/>
+          </a:effectRef>
+          <a:fontRef idx="minor">
+            <a:schemeClr val="lt1"/>
+          </a:fontRef>
+        </p:style>
+        <p:txBody>
+          <a:bodyPr rtlCol="0" anchor="ctr"/>
+          <a:lstStyle/>
+          <a:p>
+            <a:pPr algn="ctr"/>
+            <a:r>
+              <a:rPr lang="en-US" sz="1100" dirty="0">
+                <a:solidFill>
+                  <a:schemeClr val="tx1"/>
+                </a:solidFill>
+              </a:rPr>
+              <a:t>Create and publish</a:t>
+            </a:r>
+          </a:p>
+        </p:txBody>
+      </p:sp>
+      <p:sp>
+        <p:nvSpPr>
+          <p:cNvPr id="14" name="Right Arrow 32">
+            <a:extLst>
+              <a:ext uri="{FF2B5EF4-FFF2-40B4-BE49-F238E27FC236}">
+                <a16:creationId xmlns:a16="http://schemas.microsoft.com/office/drawing/2014/main" id="{A9210FD3-807F-CF3D-90BD-FDE513F72C82}"/>
+              </a:ext>
+            </a:extLst>
+          </p:cNvPr>
+          <p:cNvSpPr/>
+          <p:nvPr/>
+        </p:nvSpPr>
+        <p:spPr>
+          <a:xfrm>
+            <a:off x="921886" y="3170970"/>
+            <a:ext cx="1172890" cy="674131"/>
+          </a:xfrm>
+          <a:prstGeom prst="rightArrow">
+            <a:avLst/>
+          </a:prstGeom>
+          <a:solidFill>
+            <a:schemeClr val="accent6">
+              <a:lumMod val="40000"/>
+              <a:lumOff val="60000"/>
+            </a:schemeClr>
+          </a:solidFill>
+          <a:ln>
+            <a:solidFill>
+              <a:schemeClr val="tx1"/>
+            </a:solidFill>
+            <a:prstDash val="solid"/>
+          </a:ln>
+        </p:spPr>
+        <p:style>
+          <a:lnRef idx="1">
+            <a:schemeClr val="accent1"/>
+          </a:lnRef>
+          <a:fillRef idx="3">
+            <a:schemeClr val="accent1"/>
+          </a:fillRef>
+          <a:effectRef idx="2">
+            <a:schemeClr val="accent1"/>
+          </a:effectRef>
+          <a:fontRef idx="minor">
+            <a:schemeClr val="lt1"/>
+          </a:fontRef>
+        </p:style>
+        <p:txBody>
+          <a:bodyPr rtlCol="0" anchor="ctr"/>
+          <a:lstStyle/>
+          <a:p>
+            <a:pPr algn="ctr"/>
+            <a:r>
+              <a:rPr lang="en-US" sz="1100" dirty="0">
+                <a:solidFill>
+                  <a:schemeClr val="tx1"/>
+                </a:solidFill>
+              </a:rPr>
+              <a:t>Create and publish</a:t>
+            </a:r>
+          </a:p>
+        </p:txBody>
+      </p:sp>
+    </p:spTree>
+    <p:extLst>
+      <p:ext uri="{BB962C8B-B14F-4D97-AF65-F5344CB8AC3E}">
+        <p14:creationId xmlns:p14="http://schemas.microsoft.com/office/powerpoint/2010/main" val="4047636853"/>
+      </p:ext>
+    </p:extLst>
+  </p:cSld>
+  <p:clrMapOvr>
+    <a:masterClrMapping/>
+  </p:clrMapOvr>
+</p:sld>
+</file>
+
+<file path=ppt/slides/slide3.xml><?xml version="1.0" encoding="utf-8"?>
+<p:sld xmlns:a="http://schemas.openxmlformats.org/drawingml/2006/main" xmlns:r="http://schemas.openxmlformats.org/officeDocument/2006/relationships" xmlns:p="http://schemas.openxmlformats.org/presentationml/2006/main">
+  <p:cSld>
+    <p:spTree>
+      <p:nvGrpSpPr>
+        <p:cNvPr id="1" name=""/>
+        <p:cNvGrpSpPr/>
+        <p:nvPr/>
+      </p:nvGrpSpPr>
+      <p:grpSpPr>
+        <a:xfrm>
+          <a:off x="0" y="0"/>
+          <a:ext cx="0" cy="0"/>
+          <a:chOff x="0" y="0"/>
+          <a:chExt cx="0" cy="0"/>
+        </a:xfrm>
+      </p:grpSpPr>
       <p:sp>
         <p:nvSpPr>
           <p:cNvPr id="65" name="Isosceles Triangle 71">
@@ -6611,7 +7382,7 @@
           <a:p>
             <a:fld id="{D69ED902-D6D9-4EE0-97FF-47651DD2F3D6}" type="slidenum">
               <a:rPr lang="nl-NL" smtClean="0"/>
-              <a:t>2</a:t>
+              <a:t>3</a:t>
             </a:fld>
             <a:endParaRPr lang="nl-NL"/>
           </a:p>

</xml_diff>